<commit_message>
Update STOCK MARKET INVESTMENT STRATEGY.pptx
</commit_message>
<xml_diff>
--- a/STOCK MARKET INVESTMENT STRATEGY.pptx
+++ b/STOCK MARKET INVESTMENT STRATEGY.pptx
@@ -301,17 +301,25 @@
 <pc:chgInfo xmlns:a="http://schemas.openxmlformats.org/drawingml/2006/main" xmlns:r="http://schemas.openxmlformats.org/officeDocument/2006/relationships" xmlns:ac="http://schemas.microsoft.com/office/drawing/2013/main/command" xmlns:pc="http://schemas.microsoft.com/office/powerpoint/2013/main/command">
   <pc:docChgLst>
     <pc:chgData name="Mlondolozi Mqadi" userId="6e92cf57f4cf8df6" providerId="LiveId" clId="{B7B1D980-D432-4CCA-BC10-413F14115E10}"/>
-    <pc:docChg chg="custSel modSld">
-      <pc:chgData name="Mlondolozi Mqadi" userId="6e92cf57f4cf8df6" providerId="LiveId" clId="{B7B1D980-D432-4CCA-BC10-413F14115E10}" dt="2023-05-11T09:11:18.952" v="28" actId="14100"/>
+    <pc:docChg chg="undo redo custSel modSld">
+      <pc:chgData name="Mlondolozi Mqadi" userId="6e92cf57f4cf8df6" providerId="LiveId" clId="{B7B1D980-D432-4CCA-BC10-413F14115E10}" dt="2023-05-11T09:49:37.327" v="692"/>
       <pc:docMkLst>
         <pc:docMk/>
       </pc:docMkLst>
       <pc:sldChg chg="addSp delSp modSp mod">
-        <pc:chgData name="Mlondolozi Mqadi" userId="6e92cf57f4cf8df6" providerId="LiveId" clId="{B7B1D980-D432-4CCA-BC10-413F14115E10}" dt="2023-05-11T09:07:14.276" v="7" actId="1076"/>
+        <pc:chgData name="Mlondolozi Mqadi" userId="6e92cf57f4cf8df6" providerId="LiveId" clId="{B7B1D980-D432-4CCA-BC10-413F14115E10}" dt="2023-05-11T09:30:12.433" v="79" actId="20577"/>
         <pc:sldMkLst>
           <pc:docMk/>
           <pc:sldMk cId="0" sldId="261"/>
         </pc:sldMkLst>
+        <pc:spChg chg="add mod">
+          <ac:chgData name="Mlondolozi Mqadi" userId="6e92cf57f4cf8df6" providerId="LiveId" clId="{B7B1D980-D432-4CCA-BC10-413F14115E10}" dt="2023-05-11T09:30:12.433" v="79" actId="20577"/>
+          <ac:spMkLst>
+            <pc:docMk/>
+            <pc:sldMk cId="0" sldId="261"/>
+            <ac:spMk id="2" creationId="{684D944A-EF00-90FB-B9F3-218E2460F57B}"/>
+          </ac:spMkLst>
+        </pc:spChg>
         <pc:picChg chg="add mod">
           <ac:chgData name="Mlondolozi Mqadi" userId="6e92cf57f4cf8df6" providerId="LiveId" clId="{B7B1D980-D432-4CCA-BC10-413F14115E10}" dt="2023-05-11T09:07:14.276" v="7" actId="1076"/>
           <ac:picMkLst>
@@ -329,14 +337,45 @@
           </ac:picMkLst>
         </pc:picChg>
       </pc:sldChg>
+      <pc:sldChg chg="addSp modSp mod">
+        <pc:chgData name="Mlondolozi Mqadi" userId="6e92cf57f4cf8df6" providerId="LiveId" clId="{B7B1D980-D432-4CCA-BC10-413F14115E10}" dt="2023-05-11T09:38:36.838" v="544" actId="20577"/>
+        <pc:sldMkLst>
+          <pc:docMk/>
+          <pc:sldMk cId="0" sldId="262"/>
+        </pc:sldMkLst>
+        <pc:spChg chg="add mod">
+          <ac:chgData name="Mlondolozi Mqadi" userId="6e92cf57f4cf8df6" providerId="LiveId" clId="{B7B1D980-D432-4CCA-BC10-413F14115E10}" dt="2023-05-11T09:38:36.838" v="544" actId="20577"/>
+          <ac:spMkLst>
+            <pc:docMk/>
+            <pc:sldMk cId="0" sldId="262"/>
+            <ac:spMk id="2" creationId="{9186C375-85B5-5BB2-BE38-5375DABA0CEC}"/>
+          </ac:spMkLst>
+        </pc:spChg>
+        <pc:picChg chg="mod">
+          <ac:chgData name="Mlondolozi Mqadi" userId="6e92cf57f4cf8df6" providerId="LiveId" clId="{B7B1D980-D432-4CCA-BC10-413F14115E10}" dt="2023-05-11T09:30:30.309" v="80" actId="14100"/>
+          <ac:picMkLst>
+            <pc:docMk/>
+            <pc:sldMk cId="0" sldId="262"/>
+            <ac:picMk id="267" creationId="{00000000-0000-0000-0000-000000000000}"/>
+          </ac:picMkLst>
+        </pc:picChg>
+      </pc:sldChg>
       <pc:sldChg chg="addSp delSp modSp mod">
-        <pc:chgData name="Mlondolozi Mqadi" userId="6e92cf57f4cf8df6" providerId="LiveId" clId="{B7B1D980-D432-4CCA-BC10-413F14115E10}" dt="2023-05-11T09:08:05.337" v="11" actId="14100"/>
+        <pc:chgData name="Mlondolozi Mqadi" userId="6e92cf57f4cf8df6" providerId="LiveId" clId="{B7B1D980-D432-4CCA-BC10-413F14115E10}" dt="2023-05-11T09:41:53.582" v="575" actId="313"/>
         <pc:sldMkLst>
           <pc:docMk/>
           <pc:sldMk cId="0" sldId="263"/>
         </pc:sldMkLst>
+        <pc:spChg chg="add mod">
+          <ac:chgData name="Mlondolozi Mqadi" userId="6e92cf57f4cf8df6" providerId="LiveId" clId="{B7B1D980-D432-4CCA-BC10-413F14115E10}" dt="2023-05-11T09:41:53.582" v="575" actId="313"/>
+          <ac:spMkLst>
+            <pc:docMk/>
+            <pc:sldMk cId="0" sldId="263"/>
+            <ac:spMk id="2" creationId="{E82510DD-5646-BC5F-C5ED-06FDE89C485B}"/>
+          </ac:spMkLst>
+        </pc:spChg>
         <pc:picChg chg="add mod">
-          <ac:chgData name="Mlondolozi Mqadi" userId="6e92cf57f4cf8df6" providerId="LiveId" clId="{B7B1D980-D432-4CCA-BC10-413F14115E10}" dt="2023-05-11T09:08:05.337" v="11" actId="14100"/>
+          <ac:chgData name="Mlondolozi Mqadi" userId="6e92cf57f4cf8df6" providerId="LiveId" clId="{B7B1D980-D432-4CCA-BC10-413F14115E10}" dt="2023-05-11T09:40:47.227" v="545" actId="14100"/>
           <ac:picMkLst>
             <pc:docMk/>
             <pc:sldMk cId="0" sldId="263"/>
@@ -352,18 +391,49 @@
           </ac:picMkLst>
         </pc:picChg>
       </pc:sldChg>
+      <pc:sldChg chg="addSp modSp mod">
+        <pc:chgData name="Mlondolozi Mqadi" userId="6e92cf57f4cf8df6" providerId="LiveId" clId="{B7B1D980-D432-4CCA-BC10-413F14115E10}" dt="2023-05-11T09:44:25.839" v="643" actId="20577"/>
+        <pc:sldMkLst>
+          <pc:docMk/>
+          <pc:sldMk cId="0" sldId="264"/>
+        </pc:sldMkLst>
+        <pc:spChg chg="add mod">
+          <ac:chgData name="Mlondolozi Mqadi" userId="6e92cf57f4cf8df6" providerId="LiveId" clId="{B7B1D980-D432-4CCA-BC10-413F14115E10}" dt="2023-05-11T09:44:25.839" v="643" actId="20577"/>
+          <ac:spMkLst>
+            <pc:docMk/>
+            <pc:sldMk cId="0" sldId="264"/>
+            <ac:spMk id="2" creationId="{4D6C9557-EBA6-9ABB-2299-A89B86104B08}"/>
+          </ac:spMkLst>
+        </pc:spChg>
+        <pc:picChg chg="mod">
+          <ac:chgData name="Mlondolozi Mqadi" userId="6e92cf57f4cf8df6" providerId="LiveId" clId="{B7B1D980-D432-4CCA-BC10-413F14115E10}" dt="2023-05-11T09:42:19.513" v="577" actId="14100"/>
+          <ac:picMkLst>
+            <pc:docMk/>
+            <pc:sldMk cId="0" sldId="264"/>
+            <ac:picMk id="281" creationId="{00000000-0000-0000-0000-000000000000}"/>
+          </ac:picMkLst>
+        </pc:picChg>
+      </pc:sldChg>
       <pc:sldChg chg="addSp delSp modSp mod">
-        <pc:chgData name="Mlondolozi Mqadi" userId="6e92cf57f4cf8df6" providerId="LiveId" clId="{B7B1D980-D432-4CCA-BC10-413F14115E10}" dt="2023-05-11T09:09:06.645" v="16" actId="14100"/>
+        <pc:chgData name="Mlondolozi Mqadi" userId="6e92cf57f4cf8df6" providerId="LiveId" clId="{B7B1D980-D432-4CCA-BC10-413F14115E10}" dt="2023-05-11T09:49:37.327" v="692"/>
         <pc:sldMkLst>
           <pc:docMk/>
           <pc:sldMk cId="0" sldId="265"/>
         </pc:sldMkLst>
-        <pc:picChg chg="add mod">
-          <ac:chgData name="Mlondolozi Mqadi" userId="6e92cf57f4cf8df6" providerId="LiveId" clId="{B7B1D980-D432-4CCA-BC10-413F14115E10}" dt="2023-05-11T09:09:06.645" v="16" actId="14100"/>
+        <pc:picChg chg="add del mod">
+          <ac:chgData name="Mlondolozi Mqadi" userId="6e92cf57f4cf8df6" providerId="LiveId" clId="{B7B1D980-D432-4CCA-BC10-413F14115E10}" dt="2023-05-11T09:49:34.402" v="691" actId="478"/>
           <ac:picMkLst>
             <pc:docMk/>
             <pc:sldMk cId="0" sldId="265"/>
             <ac:picMk id="3" creationId="{8C08F3C6-D794-7409-E1A1-C68F85370B5E}"/>
+          </ac:picMkLst>
+        </pc:picChg>
+        <pc:picChg chg="add mod">
+          <ac:chgData name="Mlondolozi Mqadi" userId="6e92cf57f4cf8df6" providerId="LiveId" clId="{B7B1D980-D432-4CCA-BC10-413F14115E10}" dt="2023-05-11T09:49:37.327" v="692"/>
+          <ac:picMkLst>
+            <pc:docMk/>
+            <pc:sldMk cId="0" sldId="265"/>
+            <ac:picMk id="4" creationId="{E45264F8-541E-41DC-C205-50BA68B511BB}"/>
           </ac:picMkLst>
         </pc:picChg>
         <pc:picChg chg="del">
@@ -372,6 +442,29 @@
             <pc:docMk/>
             <pc:sldMk cId="0" sldId="265"/>
             <ac:picMk id="288" creationId="{00000000-0000-0000-0000-000000000000}"/>
+          </ac:picMkLst>
+        </pc:picChg>
+      </pc:sldChg>
+      <pc:sldChg chg="addSp modSp mod">
+        <pc:chgData name="Mlondolozi Mqadi" userId="6e92cf57f4cf8df6" providerId="LiveId" clId="{B7B1D980-D432-4CCA-BC10-413F14115E10}" dt="2023-05-11T09:45:46.936" v="690" actId="20577"/>
+        <pc:sldMkLst>
+          <pc:docMk/>
+          <pc:sldMk cId="0" sldId="266"/>
+        </pc:sldMkLst>
+        <pc:spChg chg="add mod">
+          <ac:chgData name="Mlondolozi Mqadi" userId="6e92cf57f4cf8df6" providerId="LiveId" clId="{B7B1D980-D432-4CCA-BC10-413F14115E10}" dt="2023-05-11T09:45:46.936" v="690" actId="20577"/>
+          <ac:spMkLst>
+            <pc:docMk/>
+            <pc:sldMk cId="0" sldId="266"/>
+            <ac:spMk id="2" creationId="{4FE47FCF-0723-DDD7-15FB-4CCEBF8E76C1}"/>
+          </ac:spMkLst>
+        </pc:spChg>
+        <pc:picChg chg="mod">
+          <ac:chgData name="Mlondolozi Mqadi" userId="6e92cf57f4cf8df6" providerId="LiveId" clId="{B7B1D980-D432-4CCA-BC10-413F14115E10}" dt="2023-05-11T09:45:10.307" v="644" actId="14100"/>
+          <ac:picMkLst>
+            <pc:docMk/>
+            <pc:sldMk cId="0" sldId="266"/>
+            <ac:picMk id="295" creationId="{00000000-0000-0000-0000-000000000000}"/>
           </ac:picMkLst>
         </pc:picChg>
       </pc:sldChg>
@@ -24108,10 +24201,10 @@
       </p:sp>
       <p:pic>
         <p:nvPicPr>
-          <p:cNvPr id="3" name="Picture 2">
+          <p:cNvPr id="4" name="Picture 3">
             <a:extLst>
               <a:ext uri="{FF2B5EF4-FFF2-40B4-BE49-F238E27FC236}">
-                <a16:creationId xmlns:a16="http://schemas.microsoft.com/office/drawing/2014/main" id="{8C08F3C6-D794-7409-E1A1-C68F85370B5E}"/>
+                <a16:creationId xmlns:a16="http://schemas.microsoft.com/office/drawing/2014/main" id="{E45264F8-541E-41DC-C205-50BA68B511BB}"/>
               </a:ext>
             </a:extLst>
           </p:cNvPr>
@@ -24128,8 +24221,8 @@
         </p:blipFill>
         <p:spPr>
           <a:xfrm>
-            <a:off x="725864" y="1165633"/>
-            <a:ext cx="10605155" cy="4526733"/>
+            <a:off x="0" y="1409820"/>
+            <a:ext cx="12192000" cy="4038360"/>
           </a:xfrm>
           <a:prstGeom prst="rect">
             <a:avLst/>
@@ -24205,10 +24298,10 @@
               <a:buNone/>
             </a:pPr>
             <a:r>
-              <a:rPr lang="en-US"/>
+              <a:rPr lang="en-US" dirty="0"/>
               <a:t>Bitcoin: 10-day Moving Average</a:t>
             </a:r>
-            <a:endParaRPr/>
+            <a:endParaRPr dirty="0"/>
           </a:p>
         </p:txBody>
       </p:sp>
@@ -24274,7 +24367,7 @@
         <p:spPr>
           <a:xfrm>
             <a:off x="704850" y="1181099"/>
-            <a:ext cx="10363199" cy="4695825"/>
+            <a:ext cx="10363199" cy="3795627"/>
           </a:xfrm>
           <a:prstGeom prst="rect">
             <a:avLst/>
@@ -24285,6 +24378,292 @@
           </a:ln>
         </p:spPr>
       </p:pic>
+      <p:sp>
+        <p:nvSpPr>
+          <p:cNvPr id="2" name="Google Shape;293;p28">
+            <a:extLst>
+              <a:ext uri="{FF2B5EF4-FFF2-40B4-BE49-F238E27FC236}">
+                <a16:creationId xmlns:a16="http://schemas.microsoft.com/office/drawing/2014/main" id="{4FE47FCF-0723-DDD7-15FB-4CCEBF8E76C1}"/>
+              </a:ext>
+            </a:extLst>
+          </p:cNvPr>
+          <p:cNvSpPr txBox="1">
+            <a:spLocks/>
+          </p:cNvSpPr>
+          <p:nvPr/>
+        </p:nvSpPr>
+        <p:spPr>
+          <a:xfrm>
+            <a:off x="704850" y="5175212"/>
+            <a:ext cx="10363199" cy="1332000"/>
+          </a:xfrm>
+          <a:prstGeom prst="rect">
+            <a:avLst/>
+          </a:prstGeom>
+          <a:noFill/>
+          <a:ln>
+            <a:noFill/>
+          </a:ln>
+        </p:spPr>
+        <p:txBody>
+          <a:bodyPr spcFirstLastPara="1" wrap="square" lIns="0" tIns="0" rIns="0" bIns="0" anchor="t" anchorCtr="0">
+            <a:noAutofit/>
+          </a:bodyPr>
+          <a:lstStyle>
+            <a:defPPr marR="0" lvl="0" algn="l" rtl="0">
+              <a:lnSpc>
+                <a:spcPct val="100000"/>
+              </a:lnSpc>
+              <a:spcBef>
+                <a:spcPts val="0"/>
+              </a:spcBef>
+              <a:spcAft>
+                <a:spcPts val="0"/>
+              </a:spcAft>
+            </a:defPPr>
+            <a:lvl1pPr marR="0" lvl="0" algn="l" rtl="0">
+              <a:lnSpc>
+                <a:spcPct val="90000"/>
+              </a:lnSpc>
+              <a:spcBef>
+                <a:spcPts val="0"/>
+              </a:spcBef>
+              <a:spcAft>
+                <a:spcPts val="0"/>
+              </a:spcAft>
+              <a:buClr>
+                <a:schemeClr val="lt1"/>
+              </a:buClr>
+              <a:buSzPts val="4800"/>
+              <a:buFont typeface="Play"/>
+              <a:buNone/>
+              <a:defRPr sz="4800" b="0" i="0" u="none" strike="noStrike" cap="none">
+                <a:solidFill>
+                  <a:schemeClr val="lt1"/>
+                </a:solidFill>
+                <a:latin typeface="Play"/>
+                <a:ea typeface="Play"/>
+                <a:cs typeface="Play"/>
+                <a:sym typeface="Play"/>
+              </a:defRPr>
+            </a:lvl1pPr>
+            <a:lvl2pPr marR="0" lvl="1" algn="l" rtl="0">
+              <a:lnSpc>
+                <a:spcPct val="100000"/>
+              </a:lnSpc>
+              <a:spcBef>
+                <a:spcPts val="0"/>
+              </a:spcBef>
+              <a:spcAft>
+                <a:spcPts val="0"/>
+              </a:spcAft>
+              <a:buClr>
+                <a:srgbClr val="000000"/>
+              </a:buClr>
+              <a:buSzPts val="1400"/>
+              <a:buFont typeface="Arial"/>
+              <a:buNone/>
+              <a:defRPr sz="1800" b="0" i="0" u="none" strike="noStrike" cap="none">
+                <a:solidFill>
+                  <a:srgbClr val="000000"/>
+                </a:solidFill>
+                <a:latin typeface="Arial"/>
+                <a:ea typeface="Arial"/>
+                <a:cs typeface="Arial"/>
+                <a:sym typeface="Arial"/>
+              </a:defRPr>
+            </a:lvl2pPr>
+            <a:lvl3pPr marR="0" lvl="2" algn="l" rtl="0">
+              <a:lnSpc>
+                <a:spcPct val="100000"/>
+              </a:lnSpc>
+              <a:spcBef>
+                <a:spcPts val="0"/>
+              </a:spcBef>
+              <a:spcAft>
+                <a:spcPts val="0"/>
+              </a:spcAft>
+              <a:buClr>
+                <a:srgbClr val="000000"/>
+              </a:buClr>
+              <a:buSzPts val="1400"/>
+              <a:buFont typeface="Arial"/>
+              <a:buNone/>
+              <a:defRPr sz="1800" b="0" i="0" u="none" strike="noStrike" cap="none">
+                <a:solidFill>
+                  <a:srgbClr val="000000"/>
+                </a:solidFill>
+                <a:latin typeface="Arial"/>
+                <a:ea typeface="Arial"/>
+                <a:cs typeface="Arial"/>
+                <a:sym typeface="Arial"/>
+              </a:defRPr>
+            </a:lvl3pPr>
+            <a:lvl4pPr marR="0" lvl="3" algn="l" rtl="0">
+              <a:lnSpc>
+                <a:spcPct val="100000"/>
+              </a:lnSpc>
+              <a:spcBef>
+                <a:spcPts val="0"/>
+              </a:spcBef>
+              <a:spcAft>
+                <a:spcPts val="0"/>
+              </a:spcAft>
+              <a:buClr>
+                <a:srgbClr val="000000"/>
+              </a:buClr>
+              <a:buSzPts val="1400"/>
+              <a:buFont typeface="Arial"/>
+              <a:buNone/>
+              <a:defRPr sz="1800" b="0" i="0" u="none" strike="noStrike" cap="none">
+                <a:solidFill>
+                  <a:srgbClr val="000000"/>
+                </a:solidFill>
+                <a:latin typeface="Arial"/>
+                <a:ea typeface="Arial"/>
+                <a:cs typeface="Arial"/>
+                <a:sym typeface="Arial"/>
+              </a:defRPr>
+            </a:lvl4pPr>
+            <a:lvl5pPr marR="0" lvl="4" algn="l" rtl="0">
+              <a:lnSpc>
+                <a:spcPct val="100000"/>
+              </a:lnSpc>
+              <a:spcBef>
+                <a:spcPts val="0"/>
+              </a:spcBef>
+              <a:spcAft>
+                <a:spcPts val="0"/>
+              </a:spcAft>
+              <a:buClr>
+                <a:srgbClr val="000000"/>
+              </a:buClr>
+              <a:buSzPts val="1400"/>
+              <a:buFont typeface="Arial"/>
+              <a:buNone/>
+              <a:defRPr sz="1800" b="0" i="0" u="none" strike="noStrike" cap="none">
+                <a:solidFill>
+                  <a:srgbClr val="000000"/>
+                </a:solidFill>
+                <a:latin typeface="Arial"/>
+                <a:ea typeface="Arial"/>
+                <a:cs typeface="Arial"/>
+                <a:sym typeface="Arial"/>
+              </a:defRPr>
+            </a:lvl5pPr>
+            <a:lvl6pPr marR="0" lvl="5" algn="l" rtl="0">
+              <a:lnSpc>
+                <a:spcPct val="100000"/>
+              </a:lnSpc>
+              <a:spcBef>
+                <a:spcPts val="0"/>
+              </a:spcBef>
+              <a:spcAft>
+                <a:spcPts val="0"/>
+              </a:spcAft>
+              <a:buClr>
+                <a:srgbClr val="000000"/>
+              </a:buClr>
+              <a:buSzPts val="1400"/>
+              <a:buFont typeface="Arial"/>
+              <a:buNone/>
+              <a:defRPr sz="1800" b="0" i="0" u="none" strike="noStrike" cap="none">
+                <a:solidFill>
+                  <a:srgbClr val="000000"/>
+                </a:solidFill>
+                <a:latin typeface="Arial"/>
+                <a:ea typeface="Arial"/>
+                <a:cs typeface="Arial"/>
+                <a:sym typeface="Arial"/>
+              </a:defRPr>
+            </a:lvl6pPr>
+            <a:lvl7pPr marR="0" lvl="6" algn="l" rtl="0">
+              <a:lnSpc>
+                <a:spcPct val="100000"/>
+              </a:lnSpc>
+              <a:spcBef>
+                <a:spcPts val="0"/>
+              </a:spcBef>
+              <a:spcAft>
+                <a:spcPts val="0"/>
+              </a:spcAft>
+              <a:buClr>
+                <a:srgbClr val="000000"/>
+              </a:buClr>
+              <a:buSzPts val="1400"/>
+              <a:buFont typeface="Arial"/>
+              <a:buNone/>
+              <a:defRPr sz="1800" b="0" i="0" u="none" strike="noStrike" cap="none">
+                <a:solidFill>
+                  <a:srgbClr val="000000"/>
+                </a:solidFill>
+                <a:latin typeface="Arial"/>
+                <a:ea typeface="Arial"/>
+                <a:cs typeface="Arial"/>
+                <a:sym typeface="Arial"/>
+              </a:defRPr>
+            </a:lvl7pPr>
+            <a:lvl8pPr marR="0" lvl="7" algn="l" rtl="0">
+              <a:lnSpc>
+                <a:spcPct val="100000"/>
+              </a:lnSpc>
+              <a:spcBef>
+                <a:spcPts val="0"/>
+              </a:spcBef>
+              <a:spcAft>
+                <a:spcPts val="0"/>
+              </a:spcAft>
+              <a:buClr>
+                <a:srgbClr val="000000"/>
+              </a:buClr>
+              <a:buSzPts val="1400"/>
+              <a:buFont typeface="Arial"/>
+              <a:buNone/>
+              <a:defRPr sz="1800" b="0" i="0" u="none" strike="noStrike" cap="none">
+                <a:solidFill>
+                  <a:srgbClr val="000000"/>
+                </a:solidFill>
+                <a:latin typeface="Arial"/>
+                <a:ea typeface="Arial"/>
+                <a:cs typeface="Arial"/>
+                <a:sym typeface="Arial"/>
+              </a:defRPr>
+            </a:lvl8pPr>
+            <a:lvl9pPr marR="0" lvl="8" algn="l" rtl="0">
+              <a:lnSpc>
+                <a:spcPct val="100000"/>
+              </a:lnSpc>
+              <a:spcBef>
+                <a:spcPts val="0"/>
+              </a:spcBef>
+              <a:spcAft>
+                <a:spcPts val="0"/>
+              </a:spcAft>
+              <a:buClr>
+                <a:srgbClr val="000000"/>
+              </a:buClr>
+              <a:buSzPts val="1400"/>
+              <a:buFont typeface="Arial"/>
+              <a:buNone/>
+              <a:defRPr sz="1800" b="0" i="0" u="none" strike="noStrike" cap="none">
+                <a:solidFill>
+                  <a:srgbClr val="000000"/>
+                </a:solidFill>
+                <a:latin typeface="Arial"/>
+                <a:ea typeface="Arial"/>
+                <a:cs typeface="Arial"/>
+                <a:sym typeface="Arial"/>
+              </a:defRPr>
+            </a:lvl9pPr>
+          </a:lstStyle>
+          <a:p>
+            <a:r>
+              <a:rPr lang="en-US" sz="1400" dirty="0"/>
+              <a:t> </a:t>
+            </a:r>
+          </a:p>
+        </p:txBody>
+      </p:sp>
     </p:spTree>
   </p:cSld>
   <p:clrMapOvr>
@@ -28013,10 +28392,10 @@
               <a:buNone/>
             </a:pPr>
             <a:r>
-              <a:rPr lang="en-US"/>
+              <a:rPr lang="en-US" dirty="0"/>
               <a:t>Closing Price : MSFT &amp; AMZN </a:t>
             </a:r>
-            <a:endParaRPr/>
+            <a:endParaRPr dirty="0"/>
           </a:p>
         </p:txBody>
       </p:sp>
@@ -28096,6 +28475,298 @@
           </a:prstGeom>
         </p:spPr>
       </p:pic>
+      <p:sp>
+        <p:nvSpPr>
+          <p:cNvPr id="2" name="Google Shape;258;p23">
+            <a:extLst>
+              <a:ext uri="{FF2B5EF4-FFF2-40B4-BE49-F238E27FC236}">
+                <a16:creationId xmlns:a16="http://schemas.microsoft.com/office/drawing/2014/main" id="{684D944A-EF00-90FB-B9F3-218E2460F57B}"/>
+              </a:ext>
+            </a:extLst>
+          </p:cNvPr>
+          <p:cNvSpPr txBox="1">
+            <a:spLocks/>
+          </p:cNvSpPr>
+          <p:nvPr/>
+        </p:nvSpPr>
+        <p:spPr>
+          <a:xfrm>
+            <a:off x="725864" y="5841212"/>
+            <a:ext cx="11152925" cy="1332000"/>
+          </a:xfrm>
+          <a:prstGeom prst="rect">
+            <a:avLst/>
+          </a:prstGeom>
+          <a:noFill/>
+          <a:ln>
+            <a:noFill/>
+          </a:ln>
+        </p:spPr>
+        <p:txBody>
+          <a:bodyPr spcFirstLastPara="1" wrap="square" lIns="0" tIns="0" rIns="0" bIns="0" anchor="t" anchorCtr="0">
+            <a:noAutofit/>
+          </a:bodyPr>
+          <a:lstStyle>
+            <a:defPPr marR="0" lvl="0" algn="l" rtl="0">
+              <a:lnSpc>
+                <a:spcPct val="100000"/>
+              </a:lnSpc>
+              <a:spcBef>
+                <a:spcPts val="0"/>
+              </a:spcBef>
+              <a:spcAft>
+                <a:spcPts val="0"/>
+              </a:spcAft>
+            </a:defPPr>
+            <a:lvl1pPr marR="0" lvl="0" algn="l" rtl="0">
+              <a:lnSpc>
+                <a:spcPct val="90000"/>
+              </a:lnSpc>
+              <a:spcBef>
+                <a:spcPts val="0"/>
+              </a:spcBef>
+              <a:spcAft>
+                <a:spcPts val="0"/>
+              </a:spcAft>
+              <a:buClr>
+                <a:schemeClr val="lt1"/>
+              </a:buClr>
+              <a:buSzPts val="4800"/>
+              <a:buFont typeface="Play"/>
+              <a:buNone/>
+              <a:defRPr sz="4800" b="0" i="0" u="none" strike="noStrike" cap="none">
+                <a:solidFill>
+                  <a:schemeClr val="lt1"/>
+                </a:solidFill>
+                <a:latin typeface="Play"/>
+                <a:ea typeface="Play"/>
+                <a:cs typeface="Play"/>
+                <a:sym typeface="Play"/>
+              </a:defRPr>
+            </a:lvl1pPr>
+            <a:lvl2pPr marR="0" lvl="1" algn="l" rtl="0">
+              <a:lnSpc>
+                <a:spcPct val="100000"/>
+              </a:lnSpc>
+              <a:spcBef>
+                <a:spcPts val="0"/>
+              </a:spcBef>
+              <a:spcAft>
+                <a:spcPts val="0"/>
+              </a:spcAft>
+              <a:buClr>
+                <a:srgbClr val="000000"/>
+              </a:buClr>
+              <a:buSzPts val="1400"/>
+              <a:buFont typeface="Arial"/>
+              <a:buNone/>
+              <a:defRPr sz="1800" b="0" i="0" u="none" strike="noStrike" cap="none">
+                <a:solidFill>
+                  <a:srgbClr val="000000"/>
+                </a:solidFill>
+                <a:latin typeface="Arial"/>
+                <a:ea typeface="Arial"/>
+                <a:cs typeface="Arial"/>
+                <a:sym typeface="Arial"/>
+              </a:defRPr>
+            </a:lvl2pPr>
+            <a:lvl3pPr marR="0" lvl="2" algn="l" rtl="0">
+              <a:lnSpc>
+                <a:spcPct val="100000"/>
+              </a:lnSpc>
+              <a:spcBef>
+                <a:spcPts val="0"/>
+              </a:spcBef>
+              <a:spcAft>
+                <a:spcPts val="0"/>
+              </a:spcAft>
+              <a:buClr>
+                <a:srgbClr val="000000"/>
+              </a:buClr>
+              <a:buSzPts val="1400"/>
+              <a:buFont typeface="Arial"/>
+              <a:buNone/>
+              <a:defRPr sz="1800" b="0" i="0" u="none" strike="noStrike" cap="none">
+                <a:solidFill>
+                  <a:srgbClr val="000000"/>
+                </a:solidFill>
+                <a:latin typeface="Arial"/>
+                <a:ea typeface="Arial"/>
+                <a:cs typeface="Arial"/>
+                <a:sym typeface="Arial"/>
+              </a:defRPr>
+            </a:lvl3pPr>
+            <a:lvl4pPr marR="0" lvl="3" algn="l" rtl="0">
+              <a:lnSpc>
+                <a:spcPct val="100000"/>
+              </a:lnSpc>
+              <a:spcBef>
+                <a:spcPts val="0"/>
+              </a:spcBef>
+              <a:spcAft>
+                <a:spcPts val="0"/>
+              </a:spcAft>
+              <a:buClr>
+                <a:srgbClr val="000000"/>
+              </a:buClr>
+              <a:buSzPts val="1400"/>
+              <a:buFont typeface="Arial"/>
+              <a:buNone/>
+              <a:defRPr sz="1800" b="0" i="0" u="none" strike="noStrike" cap="none">
+                <a:solidFill>
+                  <a:srgbClr val="000000"/>
+                </a:solidFill>
+                <a:latin typeface="Arial"/>
+                <a:ea typeface="Arial"/>
+                <a:cs typeface="Arial"/>
+                <a:sym typeface="Arial"/>
+              </a:defRPr>
+            </a:lvl4pPr>
+            <a:lvl5pPr marR="0" lvl="4" algn="l" rtl="0">
+              <a:lnSpc>
+                <a:spcPct val="100000"/>
+              </a:lnSpc>
+              <a:spcBef>
+                <a:spcPts val="0"/>
+              </a:spcBef>
+              <a:spcAft>
+                <a:spcPts val="0"/>
+              </a:spcAft>
+              <a:buClr>
+                <a:srgbClr val="000000"/>
+              </a:buClr>
+              <a:buSzPts val="1400"/>
+              <a:buFont typeface="Arial"/>
+              <a:buNone/>
+              <a:defRPr sz="1800" b="0" i="0" u="none" strike="noStrike" cap="none">
+                <a:solidFill>
+                  <a:srgbClr val="000000"/>
+                </a:solidFill>
+                <a:latin typeface="Arial"/>
+                <a:ea typeface="Arial"/>
+                <a:cs typeface="Arial"/>
+                <a:sym typeface="Arial"/>
+              </a:defRPr>
+            </a:lvl5pPr>
+            <a:lvl6pPr marR="0" lvl="5" algn="l" rtl="0">
+              <a:lnSpc>
+                <a:spcPct val="100000"/>
+              </a:lnSpc>
+              <a:spcBef>
+                <a:spcPts val="0"/>
+              </a:spcBef>
+              <a:spcAft>
+                <a:spcPts val="0"/>
+              </a:spcAft>
+              <a:buClr>
+                <a:srgbClr val="000000"/>
+              </a:buClr>
+              <a:buSzPts val="1400"/>
+              <a:buFont typeface="Arial"/>
+              <a:buNone/>
+              <a:defRPr sz="1800" b="0" i="0" u="none" strike="noStrike" cap="none">
+                <a:solidFill>
+                  <a:srgbClr val="000000"/>
+                </a:solidFill>
+                <a:latin typeface="Arial"/>
+                <a:ea typeface="Arial"/>
+                <a:cs typeface="Arial"/>
+                <a:sym typeface="Arial"/>
+              </a:defRPr>
+            </a:lvl6pPr>
+            <a:lvl7pPr marR="0" lvl="6" algn="l" rtl="0">
+              <a:lnSpc>
+                <a:spcPct val="100000"/>
+              </a:lnSpc>
+              <a:spcBef>
+                <a:spcPts val="0"/>
+              </a:spcBef>
+              <a:spcAft>
+                <a:spcPts val="0"/>
+              </a:spcAft>
+              <a:buClr>
+                <a:srgbClr val="000000"/>
+              </a:buClr>
+              <a:buSzPts val="1400"/>
+              <a:buFont typeface="Arial"/>
+              <a:buNone/>
+              <a:defRPr sz="1800" b="0" i="0" u="none" strike="noStrike" cap="none">
+                <a:solidFill>
+                  <a:srgbClr val="000000"/>
+                </a:solidFill>
+                <a:latin typeface="Arial"/>
+                <a:ea typeface="Arial"/>
+                <a:cs typeface="Arial"/>
+                <a:sym typeface="Arial"/>
+              </a:defRPr>
+            </a:lvl7pPr>
+            <a:lvl8pPr marR="0" lvl="7" algn="l" rtl="0">
+              <a:lnSpc>
+                <a:spcPct val="100000"/>
+              </a:lnSpc>
+              <a:spcBef>
+                <a:spcPts val="0"/>
+              </a:spcBef>
+              <a:spcAft>
+                <a:spcPts val="0"/>
+              </a:spcAft>
+              <a:buClr>
+                <a:srgbClr val="000000"/>
+              </a:buClr>
+              <a:buSzPts val="1400"/>
+              <a:buFont typeface="Arial"/>
+              <a:buNone/>
+              <a:defRPr sz="1800" b="0" i="0" u="none" strike="noStrike" cap="none">
+                <a:solidFill>
+                  <a:srgbClr val="000000"/>
+                </a:solidFill>
+                <a:latin typeface="Arial"/>
+                <a:ea typeface="Arial"/>
+                <a:cs typeface="Arial"/>
+                <a:sym typeface="Arial"/>
+              </a:defRPr>
+            </a:lvl8pPr>
+            <a:lvl9pPr marR="0" lvl="8" algn="l" rtl="0">
+              <a:lnSpc>
+                <a:spcPct val="100000"/>
+              </a:lnSpc>
+              <a:spcBef>
+                <a:spcPts val="0"/>
+              </a:spcBef>
+              <a:spcAft>
+                <a:spcPts val="0"/>
+              </a:spcAft>
+              <a:buClr>
+                <a:srgbClr val="000000"/>
+              </a:buClr>
+              <a:buSzPts val="1400"/>
+              <a:buFont typeface="Arial"/>
+              <a:buNone/>
+              <a:defRPr sz="1800" b="0" i="0" u="none" strike="noStrike" cap="none">
+                <a:solidFill>
+                  <a:srgbClr val="000000"/>
+                </a:solidFill>
+                <a:latin typeface="Arial"/>
+                <a:ea typeface="Arial"/>
+                <a:cs typeface="Arial"/>
+                <a:sym typeface="Arial"/>
+              </a:defRPr>
+            </a:lvl9pPr>
+          </a:lstStyle>
+          <a:p>
+            <a:r>
+              <a:rPr lang="en-US" sz="1400" dirty="0"/>
+              <a:t> - Microsoft stock has been on an up trend from 2003 till 2021 Dec then it decreased a little bit but did not move than the average increase it had previously.</a:t>
+            </a:r>
+          </a:p>
+          <a:p>
+            <a:r>
+              <a:rPr lang="en-US" sz="1400" dirty="0"/>
+              <a:t>- Amazon stock has been increasing from 2003 Jan till 2020 end of August then from there the stock price has been fluctuating between the period 2020 Sep till 2022 April.</a:t>
+            </a:r>
+          </a:p>
+        </p:txBody>
+      </p:sp>
     </p:spTree>
   </p:cSld>
   <p:clrMapOvr>
@@ -28165,10 +28836,10 @@
               <a:buNone/>
             </a:pPr>
             <a:r>
-              <a:rPr lang="en-US"/>
+              <a:rPr lang="en-US" dirty="0"/>
               <a:t>Closing Price Bitcoin</a:t>
             </a:r>
-            <a:endParaRPr/>
+            <a:endParaRPr dirty="0"/>
           </a:p>
         </p:txBody>
       </p:sp>
@@ -28233,8 +28904,8 @@
         </p:blipFill>
         <p:spPr>
           <a:xfrm>
-            <a:off x="550864" y="1263650"/>
-            <a:ext cx="10624931" cy="4924425"/>
+            <a:off x="550864" y="1263651"/>
+            <a:ext cx="10624931" cy="4015360"/>
           </a:xfrm>
           <a:prstGeom prst="rect">
             <a:avLst/>
@@ -28245,6 +28916,307 @@
           </a:ln>
         </p:spPr>
       </p:pic>
+      <p:sp>
+        <p:nvSpPr>
+          <p:cNvPr id="2" name="Google Shape;265;p24">
+            <a:extLst>
+              <a:ext uri="{FF2B5EF4-FFF2-40B4-BE49-F238E27FC236}">
+                <a16:creationId xmlns:a16="http://schemas.microsoft.com/office/drawing/2014/main" id="{9186C375-85B5-5BB2-BE38-5375DABA0CEC}"/>
+              </a:ext>
+            </a:extLst>
+          </p:cNvPr>
+          <p:cNvSpPr txBox="1">
+            <a:spLocks/>
+          </p:cNvSpPr>
+          <p:nvPr/>
+        </p:nvSpPr>
+        <p:spPr>
+          <a:xfrm>
+            <a:off x="471341" y="5421853"/>
+            <a:ext cx="10704780" cy="1332000"/>
+          </a:xfrm>
+          <a:prstGeom prst="rect">
+            <a:avLst/>
+          </a:prstGeom>
+          <a:noFill/>
+          <a:ln>
+            <a:noFill/>
+          </a:ln>
+        </p:spPr>
+        <p:txBody>
+          <a:bodyPr spcFirstLastPara="1" wrap="square" lIns="0" tIns="0" rIns="0" bIns="0" anchor="t" anchorCtr="0">
+            <a:noAutofit/>
+          </a:bodyPr>
+          <a:lstStyle>
+            <a:defPPr marR="0" lvl="0" algn="l" rtl="0">
+              <a:lnSpc>
+                <a:spcPct val="100000"/>
+              </a:lnSpc>
+              <a:spcBef>
+                <a:spcPts val="0"/>
+              </a:spcBef>
+              <a:spcAft>
+                <a:spcPts val="0"/>
+              </a:spcAft>
+            </a:defPPr>
+            <a:lvl1pPr marR="0" lvl="0" algn="l" rtl="0">
+              <a:lnSpc>
+                <a:spcPct val="90000"/>
+              </a:lnSpc>
+              <a:spcBef>
+                <a:spcPts val="0"/>
+              </a:spcBef>
+              <a:spcAft>
+                <a:spcPts val="0"/>
+              </a:spcAft>
+              <a:buClr>
+                <a:schemeClr val="lt1"/>
+              </a:buClr>
+              <a:buSzPts val="4800"/>
+              <a:buFont typeface="Play"/>
+              <a:buNone/>
+              <a:defRPr sz="4800" b="0" i="0" u="none" strike="noStrike" cap="none">
+                <a:solidFill>
+                  <a:schemeClr val="lt1"/>
+                </a:solidFill>
+                <a:latin typeface="Play"/>
+                <a:ea typeface="Play"/>
+                <a:cs typeface="Play"/>
+                <a:sym typeface="Play"/>
+              </a:defRPr>
+            </a:lvl1pPr>
+            <a:lvl2pPr marR="0" lvl="1" algn="l" rtl="0">
+              <a:lnSpc>
+                <a:spcPct val="100000"/>
+              </a:lnSpc>
+              <a:spcBef>
+                <a:spcPts val="0"/>
+              </a:spcBef>
+              <a:spcAft>
+                <a:spcPts val="0"/>
+              </a:spcAft>
+              <a:buClr>
+                <a:srgbClr val="000000"/>
+              </a:buClr>
+              <a:buSzPts val="1400"/>
+              <a:buFont typeface="Arial"/>
+              <a:buNone/>
+              <a:defRPr sz="1800" b="0" i="0" u="none" strike="noStrike" cap="none">
+                <a:solidFill>
+                  <a:srgbClr val="000000"/>
+                </a:solidFill>
+                <a:latin typeface="Arial"/>
+                <a:ea typeface="Arial"/>
+                <a:cs typeface="Arial"/>
+                <a:sym typeface="Arial"/>
+              </a:defRPr>
+            </a:lvl2pPr>
+            <a:lvl3pPr marR="0" lvl="2" algn="l" rtl="0">
+              <a:lnSpc>
+                <a:spcPct val="100000"/>
+              </a:lnSpc>
+              <a:spcBef>
+                <a:spcPts val="0"/>
+              </a:spcBef>
+              <a:spcAft>
+                <a:spcPts val="0"/>
+              </a:spcAft>
+              <a:buClr>
+                <a:srgbClr val="000000"/>
+              </a:buClr>
+              <a:buSzPts val="1400"/>
+              <a:buFont typeface="Arial"/>
+              <a:buNone/>
+              <a:defRPr sz="1800" b="0" i="0" u="none" strike="noStrike" cap="none">
+                <a:solidFill>
+                  <a:srgbClr val="000000"/>
+                </a:solidFill>
+                <a:latin typeface="Arial"/>
+                <a:ea typeface="Arial"/>
+                <a:cs typeface="Arial"/>
+                <a:sym typeface="Arial"/>
+              </a:defRPr>
+            </a:lvl3pPr>
+            <a:lvl4pPr marR="0" lvl="3" algn="l" rtl="0">
+              <a:lnSpc>
+                <a:spcPct val="100000"/>
+              </a:lnSpc>
+              <a:spcBef>
+                <a:spcPts val="0"/>
+              </a:spcBef>
+              <a:spcAft>
+                <a:spcPts val="0"/>
+              </a:spcAft>
+              <a:buClr>
+                <a:srgbClr val="000000"/>
+              </a:buClr>
+              <a:buSzPts val="1400"/>
+              <a:buFont typeface="Arial"/>
+              <a:buNone/>
+              <a:defRPr sz="1800" b="0" i="0" u="none" strike="noStrike" cap="none">
+                <a:solidFill>
+                  <a:srgbClr val="000000"/>
+                </a:solidFill>
+                <a:latin typeface="Arial"/>
+                <a:ea typeface="Arial"/>
+                <a:cs typeface="Arial"/>
+                <a:sym typeface="Arial"/>
+              </a:defRPr>
+            </a:lvl4pPr>
+            <a:lvl5pPr marR="0" lvl="4" algn="l" rtl="0">
+              <a:lnSpc>
+                <a:spcPct val="100000"/>
+              </a:lnSpc>
+              <a:spcBef>
+                <a:spcPts val="0"/>
+              </a:spcBef>
+              <a:spcAft>
+                <a:spcPts val="0"/>
+              </a:spcAft>
+              <a:buClr>
+                <a:srgbClr val="000000"/>
+              </a:buClr>
+              <a:buSzPts val="1400"/>
+              <a:buFont typeface="Arial"/>
+              <a:buNone/>
+              <a:defRPr sz="1800" b="0" i="0" u="none" strike="noStrike" cap="none">
+                <a:solidFill>
+                  <a:srgbClr val="000000"/>
+                </a:solidFill>
+                <a:latin typeface="Arial"/>
+                <a:ea typeface="Arial"/>
+                <a:cs typeface="Arial"/>
+                <a:sym typeface="Arial"/>
+              </a:defRPr>
+            </a:lvl5pPr>
+            <a:lvl6pPr marR="0" lvl="5" algn="l" rtl="0">
+              <a:lnSpc>
+                <a:spcPct val="100000"/>
+              </a:lnSpc>
+              <a:spcBef>
+                <a:spcPts val="0"/>
+              </a:spcBef>
+              <a:spcAft>
+                <a:spcPts val="0"/>
+              </a:spcAft>
+              <a:buClr>
+                <a:srgbClr val="000000"/>
+              </a:buClr>
+              <a:buSzPts val="1400"/>
+              <a:buFont typeface="Arial"/>
+              <a:buNone/>
+              <a:defRPr sz="1800" b="0" i="0" u="none" strike="noStrike" cap="none">
+                <a:solidFill>
+                  <a:srgbClr val="000000"/>
+                </a:solidFill>
+                <a:latin typeface="Arial"/>
+                <a:ea typeface="Arial"/>
+                <a:cs typeface="Arial"/>
+                <a:sym typeface="Arial"/>
+              </a:defRPr>
+            </a:lvl6pPr>
+            <a:lvl7pPr marR="0" lvl="6" algn="l" rtl="0">
+              <a:lnSpc>
+                <a:spcPct val="100000"/>
+              </a:lnSpc>
+              <a:spcBef>
+                <a:spcPts val="0"/>
+              </a:spcBef>
+              <a:spcAft>
+                <a:spcPts val="0"/>
+              </a:spcAft>
+              <a:buClr>
+                <a:srgbClr val="000000"/>
+              </a:buClr>
+              <a:buSzPts val="1400"/>
+              <a:buFont typeface="Arial"/>
+              <a:buNone/>
+              <a:defRPr sz="1800" b="0" i="0" u="none" strike="noStrike" cap="none">
+                <a:solidFill>
+                  <a:srgbClr val="000000"/>
+                </a:solidFill>
+                <a:latin typeface="Arial"/>
+                <a:ea typeface="Arial"/>
+                <a:cs typeface="Arial"/>
+                <a:sym typeface="Arial"/>
+              </a:defRPr>
+            </a:lvl7pPr>
+            <a:lvl8pPr marR="0" lvl="7" algn="l" rtl="0">
+              <a:lnSpc>
+                <a:spcPct val="100000"/>
+              </a:lnSpc>
+              <a:spcBef>
+                <a:spcPts val="0"/>
+              </a:spcBef>
+              <a:spcAft>
+                <a:spcPts val="0"/>
+              </a:spcAft>
+              <a:buClr>
+                <a:srgbClr val="000000"/>
+              </a:buClr>
+              <a:buSzPts val="1400"/>
+              <a:buFont typeface="Arial"/>
+              <a:buNone/>
+              <a:defRPr sz="1800" b="0" i="0" u="none" strike="noStrike" cap="none">
+                <a:solidFill>
+                  <a:srgbClr val="000000"/>
+                </a:solidFill>
+                <a:latin typeface="Arial"/>
+                <a:ea typeface="Arial"/>
+                <a:cs typeface="Arial"/>
+                <a:sym typeface="Arial"/>
+              </a:defRPr>
+            </a:lvl8pPr>
+            <a:lvl9pPr marR="0" lvl="8" algn="l" rtl="0">
+              <a:lnSpc>
+                <a:spcPct val="100000"/>
+              </a:lnSpc>
+              <a:spcBef>
+                <a:spcPts val="0"/>
+              </a:spcBef>
+              <a:spcAft>
+                <a:spcPts val="0"/>
+              </a:spcAft>
+              <a:buClr>
+                <a:srgbClr val="000000"/>
+              </a:buClr>
+              <a:buSzPts val="1400"/>
+              <a:buFont typeface="Arial"/>
+              <a:buNone/>
+              <a:defRPr sz="1800" b="0" i="0" u="none" strike="noStrike" cap="none">
+                <a:solidFill>
+                  <a:srgbClr val="000000"/>
+                </a:solidFill>
+                <a:latin typeface="Arial"/>
+                <a:ea typeface="Arial"/>
+                <a:cs typeface="Arial"/>
+                <a:sym typeface="Arial"/>
+              </a:defRPr>
+            </a:lvl9pPr>
+          </a:lstStyle>
+          <a:p>
+            <a:r>
+              <a:rPr lang="en-US" sz="1400" dirty="0"/>
+              <a:t> -Trend was increasing until March 2021 and dropped a bit and increased again until October 2021.</a:t>
+            </a:r>
+          </a:p>
+          <a:p>
+            <a:endParaRPr lang="en-US" sz="1400" dirty="0"/>
+          </a:p>
+          <a:p>
+            <a:r>
+              <a:rPr lang="en-US" sz="1400" dirty="0"/>
+              <a:t>- After October 2021 it dropped drastically may be to Russia and Ukraine war.</a:t>
+            </a:r>
+          </a:p>
+          <a:p>
+            <a:r>
+              <a:rPr lang="en-US" sz="1400" dirty="0"/>
+              <a:t> </a:t>
+            </a:r>
+          </a:p>
+        </p:txBody>
+      </p:sp>
     </p:spTree>
   </p:cSld>
   <p:clrMapOvr>
@@ -28314,10 +29286,10 @@
               <a:buNone/>
             </a:pPr>
             <a:r>
-              <a:rPr lang="en-US"/>
+              <a:rPr lang="en-US" dirty="0"/>
               <a:t>Sales Volume : MSFT &amp; AMZN </a:t>
             </a:r>
-            <a:endParaRPr/>
+            <a:endParaRPr dirty="0"/>
           </a:p>
         </p:txBody>
       </p:sp>
@@ -28390,13 +29362,299 @@
         <p:spPr>
           <a:xfrm>
             <a:off x="697584" y="1165633"/>
-            <a:ext cx="10850251" cy="4526733"/>
+            <a:ext cx="10850251" cy="3989073"/>
           </a:xfrm>
           <a:prstGeom prst="rect">
             <a:avLst/>
           </a:prstGeom>
         </p:spPr>
       </p:pic>
+      <p:sp>
+        <p:nvSpPr>
+          <p:cNvPr id="2" name="Google Shape;272;p25">
+            <a:extLst>
+              <a:ext uri="{FF2B5EF4-FFF2-40B4-BE49-F238E27FC236}">
+                <a16:creationId xmlns:a16="http://schemas.microsoft.com/office/drawing/2014/main" id="{E82510DD-5646-BC5F-C5ED-06FDE89C485B}"/>
+              </a:ext>
+            </a:extLst>
+          </p:cNvPr>
+          <p:cNvSpPr txBox="1">
+            <a:spLocks/>
+          </p:cNvSpPr>
+          <p:nvPr/>
+        </p:nvSpPr>
+        <p:spPr>
+          <a:xfrm>
+            <a:off x="697583" y="5345089"/>
+            <a:ext cx="10850252" cy="1332000"/>
+          </a:xfrm>
+          <a:prstGeom prst="rect">
+            <a:avLst/>
+          </a:prstGeom>
+          <a:noFill/>
+          <a:ln>
+            <a:noFill/>
+          </a:ln>
+        </p:spPr>
+        <p:txBody>
+          <a:bodyPr spcFirstLastPara="1" wrap="square" lIns="0" tIns="0" rIns="0" bIns="0" anchor="t" anchorCtr="0">
+            <a:noAutofit/>
+          </a:bodyPr>
+          <a:lstStyle>
+            <a:defPPr marR="0" lvl="0" algn="l" rtl="0">
+              <a:lnSpc>
+                <a:spcPct val="100000"/>
+              </a:lnSpc>
+              <a:spcBef>
+                <a:spcPts val="0"/>
+              </a:spcBef>
+              <a:spcAft>
+                <a:spcPts val="0"/>
+              </a:spcAft>
+            </a:defPPr>
+            <a:lvl1pPr marR="0" lvl="0" algn="l" rtl="0">
+              <a:lnSpc>
+                <a:spcPct val="90000"/>
+              </a:lnSpc>
+              <a:spcBef>
+                <a:spcPts val="0"/>
+              </a:spcBef>
+              <a:spcAft>
+                <a:spcPts val="0"/>
+              </a:spcAft>
+              <a:buClr>
+                <a:schemeClr val="lt1"/>
+              </a:buClr>
+              <a:buSzPts val="4800"/>
+              <a:buFont typeface="Play"/>
+              <a:buNone/>
+              <a:defRPr sz="4800" b="0" i="0" u="none" strike="noStrike" cap="none">
+                <a:solidFill>
+                  <a:schemeClr val="lt1"/>
+                </a:solidFill>
+                <a:latin typeface="Play"/>
+                <a:ea typeface="Play"/>
+                <a:cs typeface="Play"/>
+                <a:sym typeface="Play"/>
+              </a:defRPr>
+            </a:lvl1pPr>
+            <a:lvl2pPr marR="0" lvl="1" algn="l" rtl="0">
+              <a:lnSpc>
+                <a:spcPct val="100000"/>
+              </a:lnSpc>
+              <a:spcBef>
+                <a:spcPts val="0"/>
+              </a:spcBef>
+              <a:spcAft>
+                <a:spcPts val="0"/>
+              </a:spcAft>
+              <a:buClr>
+                <a:srgbClr val="000000"/>
+              </a:buClr>
+              <a:buSzPts val="1400"/>
+              <a:buFont typeface="Arial"/>
+              <a:buNone/>
+              <a:defRPr sz="1800" b="0" i="0" u="none" strike="noStrike" cap="none">
+                <a:solidFill>
+                  <a:srgbClr val="000000"/>
+                </a:solidFill>
+                <a:latin typeface="Arial"/>
+                <a:ea typeface="Arial"/>
+                <a:cs typeface="Arial"/>
+                <a:sym typeface="Arial"/>
+              </a:defRPr>
+            </a:lvl2pPr>
+            <a:lvl3pPr marR="0" lvl="2" algn="l" rtl="0">
+              <a:lnSpc>
+                <a:spcPct val="100000"/>
+              </a:lnSpc>
+              <a:spcBef>
+                <a:spcPts val="0"/>
+              </a:spcBef>
+              <a:spcAft>
+                <a:spcPts val="0"/>
+              </a:spcAft>
+              <a:buClr>
+                <a:srgbClr val="000000"/>
+              </a:buClr>
+              <a:buSzPts val="1400"/>
+              <a:buFont typeface="Arial"/>
+              <a:buNone/>
+              <a:defRPr sz="1800" b="0" i="0" u="none" strike="noStrike" cap="none">
+                <a:solidFill>
+                  <a:srgbClr val="000000"/>
+                </a:solidFill>
+                <a:latin typeface="Arial"/>
+                <a:ea typeface="Arial"/>
+                <a:cs typeface="Arial"/>
+                <a:sym typeface="Arial"/>
+              </a:defRPr>
+            </a:lvl3pPr>
+            <a:lvl4pPr marR="0" lvl="3" algn="l" rtl="0">
+              <a:lnSpc>
+                <a:spcPct val="100000"/>
+              </a:lnSpc>
+              <a:spcBef>
+                <a:spcPts val="0"/>
+              </a:spcBef>
+              <a:spcAft>
+                <a:spcPts val="0"/>
+              </a:spcAft>
+              <a:buClr>
+                <a:srgbClr val="000000"/>
+              </a:buClr>
+              <a:buSzPts val="1400"/>
+              <a:buFont typeface="Arial"/>
+              <a:buNone/>
+              <a:defRPr sz="1800" b="0" i="0" u="none" strike="noStrike" cap="none">
+                <a:solidFill>
+                  <a:srgbClr val="000000"/>
+                </a:solidFill>
+                <a:latin typeface="Arial"/>
+                <a:ea typeface="Arial"/>
+                <a:cs typeface="Arial"/>
+                <a:sym typeface="Arial"/>
+              </a:defRPr>
+            </a:lvl4pPr>
+            <a:lvl5pPr marR="0" lvl="4" algn="l" rtl="0">
+              <a:lnSpc>
+                <a:spcPct val="100000"/>
+              </a:lnSpc>
+              <a:spcBef>
+                <a:spcPts val="0"/>
+              </a:spcBef>
+              <a:spcAft>
+                <a:spcPts val="0"/>
+              </a:spcAft>
+              <a:buClr>
+                <a:srgbClr val="000000"/>
+              </a:buClr>
+              <a:buSzPts val="1400"/>
+              <a:buFont typeface="Arial"/>
+              <a:buNone/>
+              <a:defRPr sz="1800" b="0" i="0" u="none" strike="noStrike" cap="none">
+                <a:solidFill>
+                  <a:srgbClr val="000000"/>
+                </a:solidFill>
+                <a:latin typeface="Arial"/>
+                <a:ea typeface="Arial"/>
+                <a:cs typeface="Arial"/>
+                <a:sym typeface="Arial"/>
+              </a:defRPr>
+            </a:lvl5pPr>
+            <a:lvl6pPr marR="0" lvl="5" algn="l" rtl="0">
+              <a:lnSpc>
+                <a:spcPct val="100000"/>
+              </a:lnSpc>
+              <a:spcBef>
+                <a:spcPts val="0"/>
+              </a:spcBef>
+              <a:spcAft>
+                <a:spcPts val="0"/>
+              </a:spcAft>
+              <a:buClr>
+                <a:srgbClr val="000000"/>
+              </a:buClr>
+              <a:buSzPts val="1400"/>
+              <a:buFont typeface="Arial"/>
+              <a:buNone/>
+              <a:defRPr sz="1800" b="0" i="0" u="none" strike="noStrike" cap="none">
+                <a:solidFill>
+                  <a:srgbClr val="000000"/>
+                </a:solidFill>
+                <a:latin typeface="Arial"/>
+                <a:ea typeface="Arial"/>
+                <a:cs typeface="Arial"/>
+                <a:sym typeface="Arial"/>
+              </a:defRPr>
+            </a:lvl6pPr>
+            <a:lvl7pPr marR="0" lvl="6" algn="l" rtl="0">
+              <a:lnSpc>
+                <a:spcPct val="100000"/>
+              </a:lnSpc>
+              <a:spcBef>
+                <a:spcPts val="0"/>
+              </a:spcBef>
+              <a:spcAft>
+                <a:spcPts val="0"/>
+              </a:spcAft>
+              <a:buClr>
+                <a:srgbClr val="000000"/>
+              </a:buClr>
+              <a:buSzPts val="1400"/>
+              <a:buFont typeface="Arial"/>
+              <a:buNone/>
+              <a:defRPr sz="1800" b="0" i="0" u="none" strike="noStrike" cap="none">
+                <a:solidFill>
+                  <a:srgbClr val="000000"/>
+                </a:solidFill>
+                <a:latin typeface="Arial"/>
+                <a:ea typeface="Arial"/>
+                <a:cs typeface="Arial"/>
+                <a:sym typeface="Arial"/>
+              </a:defRPr>
+            </a:lvl7pPr>
+            <a:lvl8pPr marR="0" lvl="7" algn="l" rtl="0">
+              <a:lnSpc>
+                <a:spcPct val="100000"/>
+              </a:lnSpc>
+              <a:spcBef>
+                <a:spcPts val="0"/>
+              </a:spcBef>
+              <a:spcAft>
+                <a:spcPts val="0"/>
+              </a:spcAft>
+              <a:buClr>
+                <a:srgbClr val="000000"/>
+              </a:buClr>
+              <a:buSzPts val="1400"/>
+              <a:buFont typeface="Arial"/>
+              <a:buNone/>
+              <a:defRPr sz="1800" b="0" i="0" u="none" strike="noStrike" cap="none">
+                <a:solidFill>
+                  <a:srgbClr val="000000"/>
+                </a:solidFill>
+                <a:latin typeface="Arial"/>
+                <a:ea typeface="Arial"/>
+                <a:cs typeface="Arial"/>
+                <a:sym typeface="Arial"/>
+              </a:defRPr>
+            </a:lvl8pPr>
+            <a:lvl9pPr marR="0" lvl="8" algn="l" rtl="0">
+              <a:lnSpc>
+                <a:spcPct val="100000"/>
+              </a:lnSpc>
+              <a:spcBef>
+                <a:spcPts val="0"/>
+              </a:spcBef>
+              <a:spcAft>
+                <a:spcPts val="0"/>
+              </a:spcAft>
+              <a:buClr>
+                <a:srgbClr val="000000"/>
+              </a:buClr>
+              <a:buSzPts val="1400"/>
+              <a:buFont typeface="Arial"/>
+              <a:buNone/>
+              <a:defRPr sz="1800" b="0" i="0" u="none" strike="noStrike" cap="none">
+                <a:solidFill>
+                  <a:srgbClr val="000000"/>
+                </a:solidFill>
+                <a:latin typeface="Arial"/>
+                <a:ea typeface="Arial"/>
+                <a:cs typeface="Arial"/>
+                <a:sym typeface="Arial"/>
+              </a:defRPr>
+            </a:lvl9pPr>
+          </a:lstStyle>
+          <a:p>
+            <a:r>
+              <a:rPr lang="en-US" sz="1400" dirty="0"/>
+              <a:t> The volume for sales of amazon is higher than for Microsoft because amazon has been providing their services online which showed that most people trusted it with online transactions compared to Microsoft which was not that popular online as compared to amazon.</a:t>
+            </a:r>
+          </a:p>
+        </p:txBody>
+      </p:sp>
     </p:spTree>
   </p:cSld>
   <p:clrMapOvr>
@@ -28466,10 +29724,10 @@
               <a:buNone/>
             </a:pPr>
             <a:r>
-              <a:rPr lang="en-US"/>
+              <a:rPr lang="en-US" dirty="0"/>
               <a:t>Sales Volume Bitcoin</a:t>
             </a:r>
-            <a:endParaRPr/>
+            <a:endParaRPr dirty="0"/>
           </a:p>
         </p:txBody>
       </p:sp>
@@ -28534,8 +29792,8 @@
         </p:blipFill>
         <p:spPr>
           <a:xfrm>
-            <a:off x="549539" y="1162049"/>
-            <a:ext cx="10785212" cy="4714875"/>
+            <a:off x="549539" y="1162050"/>
+            <a:ext cx="10785212" cy="4055409"/>
           </a:xfrm>
           <a:prstGeom prst="rect">
             <a:avLst/>
@@ -28546,6 +29804,301 @@
           </a:ln>
         </p:spPr>
       </p:pic>
+      <p:sp>
+        <p:nvSpPr>
+          <p:cNvPr id="2" name="Google Shape;279;p26">
+            <a:extLst>
+              <a:ext uri="{FF2B5EF4-FFF2-40B4-BE49-F238E27FC236}">
+                <a16:creationId xmlns:a16="http://schemas.microsoft.com/office/drawing/2014/main" id="{4D6C9557-EBA6-9ABB-2299-A89B86104B08}"/>
+              </a:ext>
+            </a:extLst>
+          </p:cNvPr>
+          <p:cNvSpPr txBox="1">
+            <a:spLocks/>
+          </p:cNvSpPr>
+          <p:nvPr/>
+        </p:nvSpPr>
+        <p:spPr>
+          <a:xfrm>
+            <a:off x="550200" y="5387109"/>
+            <a:ext cx="10784551" cy="1332000"/>
+          </a:xfrm>
+          <a:prstGeom prst="rect">
+            <a:avLst/>
+          </a:prstGeom>
+          <a:noFill/>
+          <a:ln>
+            <a:noFill/>
+          </a:ln>
+        </p:spPr>
+        <p:txBody>
+          <a:bodyPr spcFirstLastPara="1" wrap="square" lIns="0" tIns="0" rIns="0" bIns="0" anchor="t" anchorCtr="0">
+            <a:noAutofit/>
+          </a:bodyPr>
+          <a:lstStyle>
+            <a:defPPr marR="0" lvl="0" algn="l" rtl="0">
+              <a:lnSpc>
+                <a:spcPct val="100000"/>
+              </a:lnSpc>
+              <a:spcBef>
+                <a:spcPts val="0"/>
+              </a:spcBef>
+              <a:spcAft>
+                <a:spcPts val="0"/>
+              </a:spcAft>
+            </a:defPPr>
+            <a:lvl1pPr marR="0" lvl="0" algn="l" rtl="0">
+              <a:lnSpc>
+                <a:spcPct val="90000"/>
+              </a:lnSpc>
+              <a:spcBef>
+                <a:spcPts val="0"/>
+              </a:spcBef>
+              <a:spcAft>
+                <a:spcPts val="0"/>
+              </a:spcAft>
+              <a:buClr>
+                <a:schemeClr val="lt1"/>
+              </a:buClr>
+              <a:buSzPts val="4800"/>
+              <a:buFont typeface="Play"/>
+              <a:buNone/>
+              <a:defRPr sz="4800" b="0" i="0" u="none" strike="noStrike" cap="none">
+                <a:solidFill>
+                  <a:schemeClr val="lt1"/>
+                </a:solidFill>
+                <a:latin typeface="Play"/>
+                <a:ea typeface="Play"/>
+                <a:cs typeface="Play"/>
+                <a:sym typeface="Play"/>
+              </a:defRPr>
+            </a:lvl1pPr>
+            <a:lvl2pPr marR="0" lvl="1" algn="l" rtl="0">
+              <a:lnSpc>
+                <a:spcPct val="100000"/>
+              </a:lnSpc>
+              <a:spcBef>
+                <a:spcPts val="0"/>
+              </a:spcBef>
+              <a:spcAft>
+                <a:spcPts val="0"/>
+              </a:spcAft>
+              <a:buClr>
+                <a:srgbClr val="000000"/>
+              </a:buClr>
+              <a:buSzPts val="1400"/>
+              <a:buFont typeface="Arial"/>
+              <a:buNone/>
+              <a:defRPr sz="1800" b="0" i="0" u="none" strike="noStrike" cap="none">
+                <a:solidFill>
+                  <a:srgbClr val="000000"/>
+                </a:solidFill>
+                <a:latin typeface="Arial"/>
+                <a:ea typeface="Arial"/>
+                <a:cs typeface="Arial"/>
+                <a:sym typeface="Arial"/>
+              </a:defRPr>
+            </a:lvl2pPr>
+            <a:lvl3pPr marR="0" lvl="2" algn="l" rtl="0">
+              <a:lnSpc>
+                <a:spcPct val="100000"/>
+              </a:lnSpc>
+              <a:spcBef>
+                <a:spcPts val="0"/>
+              </a:spcBef>
+              <a:spcAft>
+                <a:spcPts val="0"/>
+              </a:spcAft>
+              <a:buClr>
+                <a:srgbClr val="000000"/>
+              </a:buClr>
+              <a:buSzPts val="1400"/>
+              <a:buFont typeface="Arial"/>
+              <a:buNone/>
+              <a:defRPr sz="1800" b="0" i="0" u="none" strike="noStrike" cap="none">
+                <a:solidFill>
+                  <a:srgbClr val="000000"/>
+                </a:solidFill>
+                <a:latin typeface="Arial"/>
+                <a:ea typeface="Arial"/>
+                <a:cs typeface="Arial"/>
+                <a:sym typeface="Arial"/>
+              </a:defRPr>
+            </a:lvl3pPr>
+            <a:lvl4pPr marR="0" lvl="3" algn="l" rtl="0">
+              <a:lnSpc>
+                <a:spcPct val="100000"/>
+              </a:lnSpc>
+              <a:spcBef>
+                <a:spcPts val="0"/>
+              </a:spcBef>
+              <a:spcAft>
+                <a:spcPts val="0"/>
+              </a:spcAft>
+              <a:buClr>
+                <a:srgbClr val="000000"/>
+              </a:buClr>
+              <a:buSzPts val="1400"/>
+              <a:buFont typeface="Arial"/>
+              <a:buNone/>
+              <a:defRPr sz="1800" b="0" i="0" u="none" strike="noStrike" cap="none">
+                <a:solidFill>
+                  <a:srgbClr val="000000"/>
+                </a:solidFill>
+                <a:latin typeface="Arial"/>
+                <a:ea typeface="Arial"/>
+                <a:cs typeface="Arial"/>
+                <a:sym typeface="Arial"/>
+              </a:defRPr>
+            </a:lvl4pPr>
+            <a:lvl5pPr marR="0" lvl="4" algn="l" rtl="0">
+              <a:lnSpc>
+                <a:spcPct val="100000"/>
+              </a:lnSpc>
+              <a:spcBef>
+                <a:spcPts val="0"/>
+              </a:spcBef>
+              <a:spcAft>
+                <a:spcPts val="0"/>
+              </a:spcAft>
+              <a:buClr>
+                <a:srgbClr val="000000"/>
+              </a:buClr>
+              <a:buSzPts val="1400"/>
+              <a:buFont typeface="Arial"/>
+              <a:buNone/>
+              <a:defRPr sz="1800" b="0" i="0" u="none" strike="noStrike" cap="none">
+                <a:solidFill>
+                  <a:srgbClr val="000000"/>
+                </a:solidFill>
+                <a:latin typeface="Arial"/>
+                <a:ea typeface="Arial"/>
+                <a:cs typeface="Arial"/>
+                <a:sym typeface="Arial"/>
+              </a:defRPr>
+            </a:lvl5pPr>
+            <a:lvl6pPr marR="0" lvl="5" algn="l" rtl="0">
+              <a:lnSpc>
+                <a:spcPct val="100000"/>
+              </a:lnSpc>
+              <a:spcBef>
+                <a:spcPts val="0"/>
+              </a:spcBef>
+              <a:spcAft>
+                <a:spcPts val="0"/>
+              </a:spcAft>
+              <a:buClr>
+                <a:srgbClr val="000000"/>
+              </a:buClr>
+              <a:buSzPts val="1400"/>
+              <a:buFont typeface="Arial"/>
+              <a:buNone/>
+              <a:defRPr sz="1800" b="0" i="0" u="none" strike="noStrike" cap="none">
+                <a:solidFill>
+                  <a:srgbClr val="000000"/>
+                </a:solidFill>
+                <a:latin typeface="Arial"/>
+                <a:ea typeface="Arial"/>
+                <a:cs typeface="Arial"/>
+                <a:sym typeface="Arial"/>
+              </a:defRPr>
+            </a:lvl6pPr>
+            <a:lvl7pPr marR="0" lvl="6" algn="l" rtl="0">
+              <a:lnSpc>
+                <a:spcPct val="100000"/>
+              </a:lnSpc>
+              <a:spcBef>
+                <a:spcPts val="0"/>
+              </a:spcBef>
+              <a:spcAft>
+                <a:spcPts val="0"/>
+              </a:spcAft>
+              <a:buClr>
+                <a:srgbClr val="000000"/>
+              </a:buClr>
+              <a:buSzPts val="1400"/>
+              <a:buFont typeface="Arial"/>
+              <a:buNone/>
+              <a:defRPr sz="1800" b="0" i="0" u="none" strike="noStrike" cap="none">
+                <a:solidFill>
+                  <a:srgbClr val="000000"/>
+                </a:solidFill>
+                <a:latin typeface="Arial"/>
+                <a:ea typeface="Arial"/>
+                <a:cs typeface="Arial"/>
+                <a:sym typeface="Arial"/>
+              </a:defRPr>
+            </a:lvl7pPr>
+            <a:lvl8pPr marR="0" lvl="7" algn="l" rtl="0">
+              <a:lnSpc>
+                <a:spcPct val="100000"/>
+              </a:lnSpc>
+              <a:spcBef>
+                <a:spcPts val="0"/>
+              </a:spcBef>
+              <a:spcAft>
+                <a:spcPts val="0"/>
+              </a:spcAft>
+              <a:buClr>
+                <a:srgbClr val="000000"/>
+              </a:buClr>
+              <a:buSzPts val="1400"/>
+              <a:buFont typeface="Arial"/>
+              <a:buNone/>
+              <a:defRPr sz="1800" b="0" i="0" u="none" strike="noStrike" cap="none">
+                <a:solidFill>
+                  <a:srgbClr val="000000"/>
+                </a:solidFill>
+                <a:latin typeface="Arial"/>
+                <a:ea typeface="Arial"/>
+                <a:cs typeface="Arial"/>
+                <a:sym typeface="Arial"/>
+              </a:defRPr>
+            </a:lvl8pPr>
+            <a:lvl9pPr marR="0" lvl="8" algn="l" rtl="0">
+              <a:lnSpc>
+                <a:spcPct val="100000"/>
+              </a:lnSpc>
+              <a:spcBef>
+                <a:spcPts val="0"/>
+              </a:spcBef>
+              <a:spcAft>
+                <a:spcPts val="0"/>
+              </a:spcAft>
+              <a:buClr>
+                <a:srgbClr val="000000"/>
+              </a:buClr>
+              <a:buSzPts val="1400"/>
+              <a:buFont typeface="Arial"/>
+              <a:buNone/>
+              <a:defRPr sz="1800" b="0" i="0" u="none" strike="noStrike" cap="none">
+                <a:solidFill>
+                  <a:srgbClr val="000000"/>
+                </a:solidFill>
+                <a:latin typeface="Arial"/>
+                <a:ea typeface="Arial"/>
+                <a:cs typeface="Arial"/>
+                <a:sym typeface="Arial"/>
+              </a:defRPr>
+            </a:lvl9pPr>
+          </a:lstStyle>
+          <a:p>
+            <a:r>
+              <a:rPr lang="en-US" sz="1400" dirty="0"/>
+              <a:t>  - Bitcoin was low most people thought it was the right time to buy Bitcoin since it was cheap so they hoped that it might gain strength</a:t>
+            </a:r>
+          </a:p>
+          <a:p>
+            <a:endParaRPr lang="en-US" sz="1400" dirty="0"/>
+          </a:p>
+          <a:p>
+            <a:r>
+              <a:rPr lang="en-US" sz="1400" dirty="0"/>
+              <a:t> - Since the ongoing war made it lose more value hence you saw a lot of people dropping their investments from it since it was too risky to invest in.</a:t>
+            </a:r>
+          </a:p>
+        </p:txBody>
+      </p:sp>
     </p:spTree>
   </p:cSld>
   <p:clrMapOvr>

</xml_diff>